<commit_message>
include code for adjacency matrices
</commit_message>
<xml_diff>
--- a/code/plots/Fig2.pptx
+++ b/code/plots/Fig2.pptx
@@ -115,7 +115,7 @@
             <a:srgbClr val="A4A3A4"/>
           </p15:clr>
         </p15:guide>
-        <p15:guide id="2" pos="703" userDrawn="1">
+        <p15:guide id="2" pos="1111" userDrawn="1">
           <p15:clr>
             <a:srgbClr val="A4A3A4"/>
           </p15:clr>
@@ -208,7 +208,7 @@
           <a:p>
             <a:fld id="{1E5698F5-DEA0-574B-8461-10AB5FBB4AF3}" type="datetimeFigureOut">
               <a:rPr lang="en-GB" smtClean="0"/>
-              <a:t>10/03/2022</a:t>
+              <a:t>14/03/2022</a:t>
             </a:fld>
             <a:endParaRPr lang="en-GB"/>
           </a:p>
@@ -690,7 +690,7 @@
           <a:p>
             <a:fld id="{68B74616-76D1-994D-8327-C5E87A869FBE}" type="datetimeFigureOut">
               <a:rPr lang="en-GB" smtClean="0"/>
-              <a:t>10/03/2022</a:t>
+              <a:t>14/03/2022</a:t>
             </a:fld>
             <a:endParaRPr lang="en-GB"/>
           </a:p>
@@ -860,7 +860,7 @@
           <a:p>
             <a:fld id="{68B74616-76D1-994D-8327-C5E87A869FBE}" type="datetimeFigureOut">
               <a:rPr lang="en-GB" smtClean="0"/>
-              <a:t>10/03/2022</a:t>
+              <a:t>14/03/2022</a:t>
             </a:fld>
             <a:endParaRPr lang="en-GB"/>
           </a:p>
@@ -1040,7 +1040,7 @@
           <a:p>
             <a:fld id="{68B74616-76D1-994D-8327-C5E87A869FBE}" type="datetimeFigureOut">
               <a:rPr lang="en-GB" smtClean="0"/>
-              <a:t>10/03/2022</a:t>
+              <a:t>14/03/2022</a:t>
             </a:fld>
             <a:endParaRPr lang="en-GB"/>
           </a:p>
@@ -1210,7 +1210,7 @@
           <a:p>
             <a:fld id="{68B74616-76D1-994D-8327-C5E87A869FBE}" type="datetimeFigureOut">
               <a:rPr lang="en-GB" smtClean="0"/>
-              <a:t>10/03/2022</a:t>
+              <a:t>14/03/2022</a:t>
             </a:fld>
             <a:endParaRPr lang="en-GB"/>
           </a:p>
@@ -1454,7 +1454,7 @@
           <a:p>
             <a:fld id="{68B74616-76D1-994D-8327-C5E87A869FBE}" type="datetimeFigureOut">
               <a:rPr lang="en-GB" smtClean="0"/>
-              <a:t>10/03/2022</a:t>
+              <a:t>14/03/2022</a:t>
             </a:fld>
             <a:endParaRPr lang="en-GB"/>
           </a:p>
@@ -1686,7 +1686,7 @@
           <a:p>
             <a:fld id="{68B74616-76D1-994D-8327-C5E87A869FBE}" type="datetimeFigureOut">
               <a:rPr lang="en-GB" smtClean="0"/>
-              <a:t>10/03/2022</a:t>
+              <a:t>14/03/2022</a:t>
             </a:fld>
             <a:endParaRPr lang="en-GB"/>
           </a:p>
@@ -2053,7 +2053,7 @@
           <a:p>
             <a:fld id="{68B74616-76D1-994D-8327-C5E87A869FBE}" type="datetimeFigureOut">
               <a:rPr lang="en-GB" smtClean="0"/>
-              <a:t>10/03/2022</a:t>
+              <a:t>14/03/2022</a:t>
             </a:fld>
             <a:endParaRPr lang="en-GB"/>
           </a:p>
@@ -2171,7 +2171,7 @@
           <a:p>
             <a:fld id="{68B74616-76D1-994D-8327-C5E87A869FBE}" type="datetimeFigureOut">
               <a:rPr lang="en-GB" smtClean="0"/>
-              <a:t>10/03/2022</a:t>
+              <a:t>14/03/2022</a:t>
             </a:fld>
             <a:endParaRPr lang="en-GB"/>
           </a:p>
@@ -2266,7 +2266,7 @@
           <a:p>
             <a:fld id="{68B74616-76D1-994D-8327-C5E87A869FBE}" type="datetimeFigureOut">
               <a:rPr lang="en-GB" smtClean="0"/>
-              <a:t>10/03/2022</a:t>
+              <a:t>14/03/2022</a:t>
             </a:fld>
             <a:endParaRPr lang="en-GB"/>
           </a:p>
@@ -2543,7 +2543,7 @@
           <a:p>
             <a:fld id="{68B74616-76D1-994D-8327-C5E87A869FBE}" type="datetimeFigureOut">
               <a:rPr lang="en-GB" smtClean="0"/>
-              <a:t>10/03/2022</a:t>
+              <a:t>14/03/2022</a:t>
             </a:fld>
             <a:endParaRPr lang="en-GB"/>
           </a:p>
@@ -2800,7 +2800,7 @@
           <a:p>
             <a:fld id="{68B74616-76D1-994D-8327-C5E87A869FBE}" type="datetimeFigureOut">
               <a:rPr lang="en-GB" smtClean="0"/>
-              <a:t>10/03/2022</a:t>
+              <a:t>14/03/2022</a:t>
             </a:fld>
             <a:endParaRPr lang="en-GB"/>
           </a:p>
@@ -3013,7 +3013,7 @@
           <a:p>
             <a:fld id="{68B74616-76D1-994D-8327-C5E87A869FBE}" type="datetimeFigureOut">
               <a:rPr lang="en-GB" smtClean="0"/>
-              <a:t>10/03/2022</a:t>
+              <a:t>14/03/2022</a:t>
             </a:fld>
             <a:endParaRPr lang="en-GB"/>
           </a:p>
@@ -3418,6 +3418,36 @@
           <a:chExt cx="0" cy="0"/>
         </a:xfrm>
       </p:grpSpPr>
+      <p:pic>
+        <p:nvPicPr>
+          <p:cNvPr id="17" name="Picture 16">
+            <a:extLst>
+              <a:ext uri="{FF2B5EF4-FFF2-40B4-BE49-F238E27FC236}">
+                <a16:creationId xmlns:a16="http://schemas.microsoft.com/office/drawing/2014/main" id="{B7C4A3AE-A6A9-3A4E-8134-40A645A9D5B5}"/>
+              </a:ext>
+            </a:extLst>
+          </p:cNvPr>
+          <p:cNvPicPr>
+            <a:picLocks noChangeAspect="1"/>
+          </p:cNvPicPr>
+          <p:nvPr/>
+        </p:nvPicPr>
+        <p:blipFill>
+          <a:blip r:embed="rId3"/>
+          <a:stretch>
+            <a:fillRect/>
+          </a:stretch>
+        </p:blipFill>
+        <p:spPr>
+          <a:xfrm>
+            <a:off x="2056069" y="342467"/>
+            <a:ext cx="4784469" cy="4325033"/>
+          </a:xfrm>
+          <a:prstGeom prst="rect">
+            <a:avLst/>
+          </a:prstGeom>
+        </p:spPr>
+      </p:pic>
       <p:sp>
         <p:nvSpPr>
           <p:cNvPr id="8" name="Rectangle 7">
@@ -3465,35 +3495,6 @@
           </a:p>
         </p:txBody>
       </p:sp>
-      <p:pic>
-        <p:nvPicPr>
-          <p:cNvPr id="4" name="Picture 3">
-            <a:extLst>
-              <a:ext uri="{FF2B5EF4-FFF2-40B4-BE49-F238E27FC236}">
-                <a16:creationId xmlns:a16="http://schemas.microsoft.com/office/drawing/2014/main" id="{DF67BA41-9EAD-2349-AA89-6B9AADEC377E}"/>
-              </a:ext>
-            </a:extLst>
-          </p:cNvPr>
-          <p:cNvPicPr>
-            <a:picLocks noChangeAspect="1"/>
-          </p:cNvPicPr>
-          <p:nvPr/>
-        </p:nvPicPr>
-        <p:blipFill rotWithShape="1">
-          <a:blip r:embed="rId3"/>
-          <a:srcRect t="2228"/>
-          <a:stretch/>
-        </p:blipFill>
-        <p:spPr>
-          <a:xfrm>
-            <a:off x="1678132" y="112929"/>
-            <a:ext cx="5162406" cy="4318314"/>
-          </a:xfrm>
-          <a:prstGeom prst="rect">
-            <a:avLst/>
-          </a:prstGeom>
-        </p:spPr>
-      </p:pic>
       <p:sp>
         <p:nvSpPr>
           <p:cNvPr id="10" name="TextBox 9">
@@ -3508,7 +3509,7 @@
         </p:nvSpPr>
         <p:spPr>
           <a:xfrm>
-            <a:off x="982020" y="112929"/>
+            <a:off x="1616352" y="377653"/>
             <a:ext cx="312906" cy="369332"/>
           </a:xfrm>
           <a:prstGeom prst="rect">
@@ -3548,7 +3549,7 @@
         </p:nvSpPr>
         <p:spPr>
           <a:xfrm>
-            <a:off x="969196" y="1961514"/>
+            <a:off x="1600725" y="2292357"/>
             <a:ext cx="325730" cy="369332"/>
           </a:xfrm>
           <a:prstGeom prst="rect">
@@ -3588,7 +3589,7 @@
         </p:nvSpPr>
         <p:spPr>
           <a:xfrm>
-            <a:off x="959560" y="4325033"/>
+            <a:off x="1607260" y="4860131"/>
             <a:ext cx="312906" cy="369332"/>
           </a:xfrm>
           <a:prstGeom prst="rect">
@@ -3614,35 +3615,6 @@
           </a:p>
         </p:txBody>
       </p:sp>
-      <p:pic>
-        <p:nvPicPr>
-          <p:cNvPr id="3" name="Picture 2" descr="Chart&#10;&#10;Description automatically generated">
-            <a:extLst>
-              <a:ext uri="{FF2B5EF4-FFF2-40B4-BE49-F238E27FC236}">
-                <a16:creationId xmlns:a16="http://schemas.microsoft.com/office/drawing/2014/main" id="{C383EA70-A157-154F-B4EC-0B57FD97E1A8}"/>
-              </a:ext>
-            </a:extLst>
-          </p:cNvPr>
-          <p:cNvPicPr>
-            <a:picLocks noChangeAspect="1"/>
-          </p:cNvPicPr>
-          <p:nvPr/>
-        </p:nvPicPr>
-        <p:blipFill rotWithShape="1">
-          <a:blip r:embed="rId4"/>
-          <a:srcRect l="3145" t="10141" r="8526" b="2577"/>
-          <a:stretch/>
-        </p:blipFill>
-        <p:spPr>
-          <a:xfrm>
-            <a:off x="1526897" y="4467079"/>
-            <a:ext cx="5277529" cy="5214886"/>
-          </a:xfrm>
-          <a:prstGeom prst="rect">
-            <a:avLst/>
-          </a:prstGeom>
-        </p:spPr>
-      </p:pic>
       <p:pic>
         <p:nvPicPr>
           <p:cNvPr id="14" name="Picture 13">
@@ -3658,14 +3630,14 @@
           <p:nvPr/>
         </p:nvPicPr>
         <p:blipFill rotWithShape="1">
-          <a:blip r:embed="rId5"/>
+          <a:blip r:embed="rId4"/>
           <a:srcRect l="1653" t="31300" r="95378" b="48880"/>
           <a:stretch/>
         </p:blipFill>
         <p:spPr>
           <a:xfrm>
-            <a:off x="1408652" y="435318"/>
-            <a:ext cx="236491" cy="1052025"/>
+            <a:off x="1898013" y="725460"/>
+            <a:ext cx="273821" cy="1218087"/>
           </a:xfrm>
           <a:prstGeom prst="rect">
             <a:avLst/>
@@ -3687,14 +3659,14 @@
           <p:nvPr/>
         </p:nvPicPr>
         <p:blipFill rotWithShape="1">
-          <a:blip r:embed="rId5"/>
+          <a:blip r:embed="rId4"/>
           <a:srcRect l="1653" t="31300" r="95378" b="48880"/>
           <a:stretch/>
         </p:blipFill>
         <p:spPr>
           <a:xfrm>
-            <a:off x="1438718" y="2391861"/>
-            <a:ext cx="236491" cy="1052025"/>
+            <a:off x="1898014" y="2763107"/>
+            <a:ext cx="273821" cy="1218087"/>
           </a:xfrm>
           <a:prstGeom prst="rect">
             <a:avLst/>
@@ -3716,15 +3688,15 @@
           <p:nvPr/>
         </p:nvPicPr>
         <p:blipFill>
-          <a:blip r:embed="rId6"/>
+          <a:blip r:embed="rId5"/>
           <a:stretch>
             <a:fillRect/>
           </a:stretch>
         </p:blipFill>
         <p:spPr>
           <a:xfrm>
-            <a:off x="3841080" y="4318798"/>
-            <a:ext cx="1069749" cy="224890"/>
+            <a:off x="4114585" y="4549371"/>
+            <a:ext cx="1123830" cy="236259"/>
           </a:xfrm>
           <a:prstGeom prst="rect">
             <a:avLst/>
@@ -3746,14 +3718,14 @@
           <p:nvPr/>
         </p:nvPicPr>
         <p:blipFill>
-          <a:blip r:embed="rId7"/>
+          <a:blip r:embed="rId6"/>
           <a:stretch>
             <a:fillRect/>
           </a:stretch>
         </p:blipFill>
         <p:spPr>
           <a:xfrm>
-            <a:off x="1401389" y="6315664"/>
+            <a:off x="1860685" y="6646395"/>
             <a:ext cx="311150" cy="1276350"/>
           </a:xfrm>
           <a:prstGeom prst="rect">
@@ -3761,58 +3733,35 @@
           </a:prstGeom>
         </p:spPr>
       </p:pic>
-      <p:sp>
-        <p:nvSpPr>
-          <p:cNvPr id="5" name="Rectangle 4">
+      <p:pic>
+        <p:nvPicPr>
+          <p:cNvPr id="7" name="Picture 6" descr="Chart&#10;&#10;Description automatically generated">
             <a:extLst>
               <a:ext uri="{FF2B5EF4-FFF2-40B4-BE49-F238E27FC236}">
-                <a16:creationId xmlns:a16="http://schemas.microsoft.com/office/drawing/2014/main" id="{6BA3A4D7-A366-1C42-A488-5F710B389B23}"/>
+                <a16:creationId xmlns:a16="http://schemas.microsoft.com/office/drawing/2014/main" id="{A8651A4C-1B2E-CF43-80EA-4974B20BDAE3}"/>
               </a:ext>
             </a:extLst>
           </p:cNvPr>
-          <p:cNvSpPr/>
+          <p:cNvPicPr>
+            <a:picLocks noChangeAspect="1"/>
+          </p:cNvPicPr>
           <p:nvPr/>
-        </p:nvSpPr>
+        </p:nvPicPr>
+        <p:blipFill rotWithShape="1">
+          <a:blip r:embed="rId7"/>
+          <a:srcRect l="7655" t="10062" r="9425" b="3279"/>
+          <a:stretch/>
+        </p:blipFill>
         <p:spPr>
           <a:xfrm>
-            <a:off x="4028607" y="4246577"/>
-            <a:ext cx="475937" cy="78456"/>
+            <a:off x="2171835" y="4860131"/>
+            <a:ext cx="4650474" cy="4860132"/>
           </a:xfrm>
           <a:prstGeom prst="rect">
             <a:avLst/>
           </a:prstGeom>
-          <a:solidFill>
-            <a:schemeClr val="bg1"/>
-          </a:solidFill>
-          <a:ln>
-            <a:noFill/>
-          </a:ln>
         </p:spPr>
-        <p:style>
-          <a:lnRef idx="2">
-            <a:schemeClr val="accent1">
-              <a:shade val="50000"/>
-            </a:schemeClr>
-          </a:lnRef>
-          <a:fillRef idx="1">
-            <a:schemeClr val="accent1"/>
-          </a:fillRef>
-          <a:effectRef idx="0">
-            <a:schemeClr val="accent1"/>
-          </a:effectRef>
-          <a:fontRef idx="minor">
-            <a:schemeClr val="lt1"/>
-          </a:fontRef>
-        </p:style>
-        <p:txBody>
-          <a:bodyPr rtlCol="0" anchor="ctr"/>
-          <a:lstStyle/>
-          <a:p>
-            <a:pPr algn="ctr"/>
-            <a:endParaRPr lang="en-GB"/>
-          </a:p>
-        </p:txBody>
-      </p:sp>
+      </p:pic>
     </p:spTree>
     <p:extLst>
       <p:ext uri="{BB962C8B-B14F-4D97-AF65-F5344CB8AC3E}">

</xml_diff>